<commit_message>
Major updates after pilot class
</commit_message>
<xml_diff>
--- a/labmanual/English/WBT101-Binder-Cover.pptx
+++ b/labmanual/English/WBT101-Binder-Cover.pptx
@@ -244,7 +244,7 @@
           <a:p>
             <a:fld id="{FD9117CB-CD87-A145-B0DD-B1FF23D56DC0}" type="datetimeFigureOut">
               <a:rPr lang="en-US" smtClean="0"/>
-              <a:t>6/10/2018</a:t>
+              <a:t>6/18/2018</a:t>
             </a:fld>
             <a:endParaRPr lang="en-US"/>
           </a:p>
@@ -414,7 +414,7 @@
           <a:p>
             <a:fld id="{FD9117CB-CD87-A145-B0DD-B1FF23D56DC0}" type="datetimeFigureOut">
               <a:rPr lang="en-US" smtClean="0"/>
-              <a:t>6/10/2018</a:t>
+              <a:t>6/18/2018</a:t>
             </a:fld>
             <a:endParaRPr lang="en-US"/>
           </a:p>
@@ -594,7 +594,7 @@
           <a:p>
             <a:fld id="{FD9117CB-CD87-A145-B0DD-B1FF23D56DC0}" type="datetimeFigureOut">
               <a:rPr lang="en-US" smtClean="0"/>
-              <a:t>6/10/2018</a:t>
+              <a:t>6/18/2018</a:t>
             </a:fld>
             <a:endParaRPr lang="en-US"/>
           </a:p>
@@ -764,7 +764,7 @@
           <a:p>
             <a:fld id="{FD9117CB-CD87-A145-B0DD-B1FF23D56DC0}" type="datetimeFigureOut">
               <a:rPr lang="en-US" smtClean="0"/>
-              <a:t>6/10/2018</a:t>
+              <a:t>6/18/2018</a:t>
             </a:fld>
             <a:endParaRPr lang="en-US"/>
           </a:p>
@@ -1008,7 +1008,7 @@
           <a:p>
             <a:fld id="{FD9117CB-CD87-A145-B0DD-B1FF23D56DC0}" type="datetimeFigureOut">
               <a:rPr lang="en-US" smtClean="0"/>
-              <a:t>6/10/2018</a:t>
+              <a:t>6/18/2018</a:t>
             </a:fld>
             <a:endParaRPr lang="en-US"/>
           </a:p>
@@ -1240,7 +1240,7 @@
           <a:p>
             <a:fld id="{FD9117CB-CD87-A145-B0DD-B1FF23D56DC0}" type="datetimeFigureOut">
               <a:rPr lang="en-US" smtClean="0"/>
-              <a:t>6/10/2018</a:t>
+              <a:t>6/18/2018</a:t>
             </a:fld>
             <a:endParaRPr lang="en-US"/>
           </a:p>
@@ -1607,7 +1607,7 @@
           <a:p>
             <a:fld id="{FD9117CB-CD87-A145-B0DD-B1FF23D56DC0}" type="datetimeFigureOut">
               <a:rPr lang="en-US" smtClean="0"/>
-              <a:t>6/10/2018</a:t>
+              <a:t>6/18/2018</a:t>
             </a:fld>
             <a:endParaRPr lang="en-US"/>
           </a:p>
@@ -1725,7 +1725,7 @@
           <a:p>
             <a:fld id="{FD9117CB-CD87-A145-B0DD-B1FF23D56DC0}" type="datetimeFigureOut">
               <a:rPr lang="en-US" smtClean="0"/>
-              <a:t>6/10/2018</a:t>
+              <a:t>6/18/2018</a:t>
             </a:fld>
             <a:endParaRPr lang="en-US"/>
           </a:p>
@@ -1820,7 +1820,7 @@
           <a:p>
             <a:fld id="{FD9117CB-CD87-A145-B0DD-B1FF23D56DC0}" type="datetimeFigureOut">
               <a:rPr lang="en-US" smtClean="0"/>
-              <a:t>6/10/2018</a:t>
+              <a:t>6/18/2018</a:t>
             </a:fld>
             <a:endParaRPr lang="en-US"/>
           </a:p>
@@ -2097,7 +2097,7 @@
           <a:p>
             <a:fld id="{FD9117CB-CD87-A145-B0DD-B1FF23D56DC0}" type="datetimeFigureOut">
               <a:rPr lang="en-US" smtClean="0"/>
-              <a:t>6/10/2018</a:t>
+              <a:t>6/18/2018</a:t>
             </a:fld>
             <a:endParaRPr lang="en-US"/>
           </a:p>
@@ -2354,7 +2354,7 @@
           <a:p>
             <a:fld id="{FD9117CB-CD87-A145-B0DD-B1FF23D56DC0}" type="datetimeFigureOut">
               <a:rPr lang="en-US" smtClean="0"/>
-              <a:t>6/10/2018</a:t>
+              <a:t>6/18/2018</a:t>
             </a:fld>
             <a:endParaRPr lang="en-US"/>
           </a:p>
@@ -2567,7 +2567,7 @@
           <a:p>
             <a:fld id="{FD9117CB-CD87-A145-B0DD-B1FF23D56DC0}" type="datetimeFigureOut">
               <a:rPr lang="en-US" smtClean="0"/>
-              <a:t>6/10/2018</a:t>
+              <a:t>6/18/2018</a:t>
             </a:fld>
             <a:endParaRPr lang="en-US"/>
           </a:p>
@@ -3042,7 +3042,7 @@
         <p:spPr>
           <a:xfrm>
             <a:off x="0" y="6785672"/>
-            <a:ext cx="6858000" cy="1569660"/>
+            <a:ext cx="6858000" cy="1938992"/>
           </a:xfrm>
           <a:prstGeom prst="rect">
             <a:avLst/>
@@ -3071,9 +3071,17 @@
           <a:p>
             <a:pPr algn="ctr"/>
             <a:r>
-              <a:rPr lang="en-US" sz="2400" dirty="0"/>
+              <a:rPr lang="en-US" sz="2400"/>
               <a:t>Mark Saunders</a:t>
             </a:r>
+          </a:p>
+          <a:p>
+            <a:pPr algn="ctr"/>
+            <a:r>
+              <a:rPr lang="en-US" sz="2400"/>
+              <a:t>Wesley Siebenthaler</a:t>
+            </a:r>
+            <a:endParaRPr lang="en-US" sz="2400" dirty="0"/>
           </a:p>
           <a:p>
             <a:pPr algn="ctr"/>
@@ -3113,9 +3121,10 @@
           <a:lstStyle/>
           <a:p>
             <a:r>
-              <a:rPr lang="en-US" sz="1050" dirty="0"/>
-              <a:t>Version 2.2</a:t>
-            </a:r>
+              <a:rPr lang="en-US" sz="1050"/>
+              <a:t>Version 1.0</a:t>
+            </a:r>
+            <a:endParaRPr lang="en-US" sz="1050" dirty="0"/>
           </a:p>
         </p:txBody>
       </p:sp>

</xml_diff>

<commit_message>
Make sure all secitons are even # of pages, regenerate PDFs.
</commit_message>
<xml_diff>
--- a/labmanual/English/WBT101-Binder-Cover.pptx
+++ b/labmanual/English/WBT101-Binder-Cover.pptx
@@ -244,7 +244,7 @@
           <a:p>
             <a:fld id="{FD9117CB-CD87-A145-B0DD-B1FF23D56DC0}" type="datetimeFigureOut">
               <a:rPr lang="en-US" smtClean="0"/>
-              <a:t>6/18/2018</a:t>
+              <a:t>6/25/2018</a:t>
             </a:fld>
             <a:endParaRPr lang="en-US"/>
           </a:p>
@@ -414,7 +414,7 @@
           <a:p>
             <a:fld id="{FD9117CB-CD87-A145-B0DD-B1FF23D56DC0}" type="datetimeFigureOut">
               <a:rPr lang="en-US" smtClean="0"/>
-              <a:t>6/18/2018</a:t>
+              <a:t>6/25/2018</a:t>
             </a:fld>
             <a:endParaRPr lang="en-US"/>
           </a:p>
@@ -594,7 +594,7 @@
           <a:p>
             <a:fld id="{FD9117CB-CD87-A145-B0DD-B1FF23D56DC0}" type="datetimeFigureOut">
               <a:rPr lang="en-US" smtClean="0"/>
-              <a:t>6/18/2018</a:t>
+              <a:t>6/25/2018</a:t>
             </a:fld>
             <a:endParaRPr lang="en-US"/>
           </a:p>
@@ -764,7 +764,7 @@
           <a:p>
             <a:fld id="{FD9117CB-CD87-A145-B0DD-B1FF23D56DC0}" type="datetimeFigureOut">
               <a:rPr lang="en-US" smtClean="0"/>
-              <a:t>6/18/2018</a:t>
+              <a:t>6/25/2018</a:t>
             </a:fld>
             <a:endParaRPr lang="en-US"/>
           </a:p>
@@ -1008,7 +1008,7 @@
           <a:p>
             <a:fld id="{FD9117CB-CD87-A145-B0DD-B1FF23D56DC0}" type="datetimeFigureOut">
               <a:rPr lang="en-US" smtClean="0"/>
-              <a:t>6/18/2018</a:t>
+              <a:t>6/25/2018</a:t>
             </a:fld>
             <a:endParaRPr lang="en-US"/>
           </a:p>
@@ -1240,7 +1240,7 @@
           <a:p>
             <a:fld id="{FD9117CB-CD87-A145-B0DD-B1FF23D56DC0}" type="datetimeFigureOut">
               <a:rPr lang="en-US" smtClean="0"/>
-              <a:t>6/18/2018</a:t>
+              <a:t>6/25/2018</a:t>
             </a:fld>
             <a:endParaRPr lang="en-US"/>
           </a:p>
@@ -1607,7 +1607,7 @@
           <a:p>
             <a:fld id="{FD9117CB-CD87-A145-B0DD-B1FF23D56DC0}" type="datetimeFigureOut">
               <a:rPr lang="en-US" smtClean="0"/>
-              <a:t>6/18/2018</a:t>
+              <a:t>6/25/2018</a:t>
             </a:fld>
             <a:endParaRPr lang="en-US"/>
           </a:p>
@@ -1725,7 +1725,7 @@
           <a:p>
             <a:fld id="{FD9117CB-CD87-A145-B0DD-B1FF23D56DC0}" type="datetimeFigureOut">
               <a:rPr lang="en-US" smtClean="0"/>
-              <a:t>6/18/2018</a:t>
+              <a:t>6/25/2018</a:t>
             </a:fld>
             <a:endParaRPr lang="en-US"/>
           </a:p>
@@ -1820,7 +1820,7 @@
           <a:p>
             <a:fld id="{FD9117CB-CD87-A145-B0DD-B1FF23D56DC0}" type="datetimeFigureOut">
               <a:rPr lang="en-US" smtClean="0"/>
-              <a:t>6/18/2018</a:t>
+              <a:t>6/25/2018</a:t>
             </a:fld>
             <a:endParaRPr lang="en-US"/>
           </a:p>
@@ -2097,7 +2097,7 @@
           <a:p>
             <a:fld id="{FD9117CB-CD87-A145-B0DD-B1FF23D56DC0}" type="datetimeFigureOut">
               <a:rPr lang="en-US" smtClean="0"/>
-              <a:t>6/18/2018</a:t>
+              <a:t>6/25/2018</a:t>
             </a:fld>
             <a:endParaRPr lang="en-US"/>
           </a:p>
@@ -2354,7 +2354,7 @@
           <a:p>
             <a:fld id="{FD9117CB-CD87-A145-B0DD-B1FF23D56DC0}" type="datetimeFigureOut">
               <a:rPr lang="en-US" smtClean="0"/>
-              <a:t>6/18/2018</a:t>
+              <a:t>6/25/2018</a:t>
             </a:fld>
             <a:endParaRPr lang="en-US"/>
           </a:p>
@@ -2567,7 +2567,7 @@
           <a:p>
             <a:fld id="{FD9117CB-CD87-A145-B0DD-B1FF23D56DC0}" type="datetimeFigureOut">
               <a:rPr lang="en-US" smtClean="0"/>
-              <a:t>6/18/2018</a:t>
+              <a:t>6/25/2018</a:t>
             </a:fld>
             <a:endParaRPr lang="en-US"/>
           </a:p>
@@ -3041,8 +3041,8 @@
         </p:nvSpPr>
         <p:spPr>
           <a:xfrm>
-            <a:off x="0" y="6785672"/>
-            <a:ext cx="6858000" cy="1938992"/>
+            <a:off x="-19684" y="6785672"/>
+            <a:ext cx="6858000" cy="2308324"/>
           </a:xfrm>
           <a:prstGeom prst="rect">
             <a:avLst/>
@@ -3081,14 +3081,21 @@
               <a:rPr lang="en-US" sz="2400"/>
               <a:t>Wesley Siebenthaler</a:t>
             </a:r>
+          </a:p>
+          <a:p>
+            <a:pPr algn="ctr"/>
+            <a:r>
+              <a:rPr lang="en-US" sz="2400"/>
+              <a:t>Santhosh Vojjala</a:t>
+            </a:r>
+          </a:p>
+          <a:p>
+            <a:pPr algn="ctr"/>
+            <a:r>
+              <a:rPr lang="en-US" sz="2400"/>
+              <a:t>Vikram Ramanna</a:t>
+            </a:r>
             <a:endParaRPr lang="en-US" sz="2400" dirty="0"/>
-          </a:p>
-          <a:p>
-            <a:pPr algn="ctr"/>
-            <a:r>
-              <a:rPr lang="en-US" sz="2400" dirty="0"/>
-              <a:t>Vikram Ramanna</a:t>
-            </a:r>
           </a:p>
         </p:txBody>
       </p:sp>

</xml_diff>

<commit_message>
Update version to v1.1 after tagging v1.0
</commit_message>
<xml_diff>
--- a/labmanual/English/WBT101-Binder-Cover.pptx
+++ b/labmanual/English/WBT101-Binder-Cover.pptx
@@ -244,7 +244,7 @@
           <a:p>
             <a:fld id="{FD9117CB-CD87-A145-B0DD-B1FF23D56DC0}" type="datetimeFigureOut">
               <a:rPr lang="en-US" smtClean="0"/>
-              <a:t>6/25/2018</a:t>
+              <a:t>7/2/2018</a:t>
             </a:fld>
             <a:endParaRPr lang="en-US"/>
           </a:p>
@@ -414,7 +414,7 @@
           <a:p>
             <a:fld id="{FD9117CB-CD87-A145-B0DD-B1FF23D56DC0}" type="datetimeFigureOut">
               <a:rPr lang="en-US" smtClean="0"/>
-              <a:t>6/25/2018</a:t>
+              <a:t>7/2/2018</a:t>
             </a:fld>
             <a:endParaRPr lang="en-US"/>
           </a:p>
@@ -594,7 +594,7 @@
           <a:p>
             <a:fld id="{FD9117CB-CD87-A145-B0DD-B1FF23D56DC0}" type="datetimeFigureOut">
               <a:rPr lang="en-US" smtClean="0"/>
-              <a:t>6/25/2018</a:t>
+              <a:t>7/2/2018</a:t>
             </a:fld>
             <a:endParaRPr lang="en-US"/>
           </a:p>
@@ -764,7 +764,7 @@
           <a:p>
             <a:fld id="{FD9117CB-CD87-A145-B0DD-B1FF23D56DC0}" type="datetimeFigureOut">
               <a:rPr lang="en-US" smtClean="0"/>
-              <a:t>6/25/2018</a:t>
+              <a:t>7/2/2018</a:t>
             </a:fld>
             <a:endParaRPr lang="en-US"/>
           </a:p>
@@ -1008,7 +1008,7 @@
           <a:p>
             <a:fld id="{FD9117CB-CD87-A145-B0DD-B1FF23D56DC0}" type="datetimeFigureOut">
               <a:rPr lang="en-US" smtClean="0"/>
-              <a:t>6/25/2018</a:t>
+              <a:t>7/2/2018</a:t>
             </a:fld>
             <a:endParaRPr lang="en-US"/>
           </a:p>
@@ -1240,7 +1240,7 @@
           <a:p>
             <a:fld id="{FD9117CB-CD87-A145-B0DD-B1FF23D56DC0}" type="datetimeFigureOut">
               <a:rPr lang="en-US" smtClean="0"/>
-              <a:t>6/25/2018</a:t>
+              <a:t>7/2/2018</a:t>
             </a:fld>
             <a:endParaRPr lang="en-US"/>
           </a:p>
@@ -1607,7 +1607,7 @@
           <a:p>
             <a:fld id="{FD9117CB-CD87-A145-B0DD-B1FF23D56DC0}" type="datetimeFigureOut">
               <a:rPr lang="en-US" smtClean="0"/>
-              <a:t>6/25/2018</a:t>
+              <a:t>7/2/2018</a:t>
             </a:fld>
             <a:endParaRPr lang="en-US"/>
           </a:p>
@@ -1725,7 +1725,7 @@
           <a:p>
             <a:fld id="{FD9117CB-CD87-A145-B0DD-B1FF23D56DC0}" type="datetimeFigureOut">
               <a:rPr lang="en-US" smtClean="0"/>
-              <a:t>6/25/2018</a:t>
+              <a:t>7/2/2018</a:t>
             </a:fld>
             <a:endParaRPr lang="en-US"/>
           </a:p>
@@ -1820,7 +1820,7 @@
           <a:p>
             <a:fld id="{FD9117CB-CD87-A145-B0DD-B1FF23D56DC0}" type="datetimeFigureOut">
               <a:rPr lang="en-US" smtClean="0"/>
-              <a:t>6/25/2018</a:t>
+              <a:t>7/2/2018</a:t>
             </a:fld>
             <a:endParaRPr lang="en-US"/>
           </a:p>
@@ -2097,7 +2097,7 @@
           <a:p>
             <a:fld id="{FD9117CB-CD87-A145-B0DD-B1FF23D56DC0}" type="datetimeFigureOut">
               <a:rPr lang="en-US" smtClean="0"/>
-              <a:t>6/25/2018</a:t>
+              <a:t>7/2/2018</a:t>
             </a:fld>
             <a:endParaRPr lang="en-US"/>
           </a:p>
@@ -2354,7 +2354,7 @@
           <a:p>
             <a:fld id="{FD9117CB-CD87-A145-B0DD-B1FF23D56DC0}" type="datetimeFigureOut">
               <a:rPr lang="en-US" smtClean="0"/>
-              <a:t>6/25/2018</a:t>
+              <a:t>7/2/2018</a:t>
             </a:fld>
             <a:endParaRPr lang="en-US"/>
           </a:p>
@@ -2567,7 +2567,7 @@
           <a:p>
             <a:fld id="{FD9117CB-CD87-A145-B0DD-B1FF23D56DC0}" type="datetimeFigureOut">
               <a:rPr lang="en-US" smtClean="0"/>
-              <a:t>6/25/2018</a:t>
+              <a:t>7/2/2018</a:t>
             </a:fld>
             <a:endParaRPr lang="en-US"/>
           </a:p>
@@ -3129,7 +3129,7 @@
           <a:p>
             <a:r>
               <a:rPr lang="en-US" sz="1050"/>
-              <a:t>Version 1.0</a:t>
+              <a:t>Version 1.1</a:t>
             </a:r>
             <a:endParaRPr lang="en-US" sz="1050" dirty="0"/>
           </a:p>

</xml_diff>

<commit_message>
Major updates to add chapter 4D to cover BLE centrals, add Beacons, and Scan Response. Minor updates from WW1838 class in KY.
</commit_message>
<xml_diff>
--- a/labmanual/English/WBT101-Binder-Cover.pptx
+++ b/labmanual/English/WBT101-Binder-Cover.pptx
@@ -244,7 +244,7 @@
           <a:p>
             <a:fld id="{FD9117CB-CD87-A145-B0DD-B1FF23D56DC0}" type="datetimeFigureOut">
               <a:rPr lang="en-US" smtClean="0"/>
-              <a:t>9/10/2018</a:t>
+              <a:t>9/27/2018</a:t>
             </a:fld>
             <a:endParaRPr lang="en-US"/>
           </a:p>
@@ -414,7 +414,7 @@
           <a:p>
             <a:fld id="{FD9117CB-CD87-A145-B0DD-B1FF23D56DC0}" type="datetimeFigureOut">
               <a:rPr lang="en-US" smtClean="0"/>
-              <a:t>9/10/2018</a:t>
+              <a:t>9/27/2018</a:t>
             </a:fld>
             <a:endParaRPr lang="en-US"/>
           </a:p>
@@ -594,7 +594,7 @@
           <a:p>
             <a:fld id="{FD9117CB-CD87-A145-B0DD-B1FF23D56DC0}" type="datetimeFigureOut">
               <a:rPr lang="en-US" smtClean="0"/>
-              <a:t>9/10/2018</a:t>
+              <a:t>9/27/2018</a:t>
             </a:fld>
             <a:endParaRPr lang="en-US"/>
           </a:p>
@@ -764,7 +764,7 @@
           <a:p>
             <a:fld id="{FD9117CB-CD87-A145-B0DD-B1FF23D56DC0}" type="datetimeFigureOut">
               <a:rPr lang="en-US" smtClean="0"/>
-              <a:t>9/10/2018</a:t>
+              <a:t>9/27/2018</a:t>
             </a:fld>
             <a:endParaRPr lang="en-US"/>
           </a:p>
@@ -1008,7 +1008,7 @@
           <a:p>
             <a:fld id="{FD9117CB-CD87-A145-B0DD-B1FF23D56DC0}" type="datetimeFigureOut">
               <a:rPr lang="en-US" smtClean="0"/>
-              <a:t>9/10/2018</a:t>
+              <a:t>9/27/2018</a:t>
             </a:fld>
             <a:endParaRPr lang="en-US"/>
           </a:p>
@@ -1240,7 +1240,7 @@
           <a:p>
             <a:fld id="{FD9117CB-CD87-A145-B0DD-B1FF23D56DC0}" type="datetimeFigureOut">
               <a:rPr lang="en-US" smtClean="0"/>
-              <a:t>9/10/2018</a:t>
+              <a:t>9/27/2018</a:t>
             </a:fld>
             <a:endParaRPr lang="en-US"/>
           </a:p>
@@ -1607,7 +1607,7 @@
           <a:p>
             <a:fld id="{FD9117CB-CD87-A145-B0DD-B1FF23D56DC0}" type="datetimeFigureOut">
               <a:rPr lang="en-US" smtClean="0"/>
-              <a:t>9/10/2018</a:t>
+              <a:t>9/27/2018</a:t>
             </a:fld>
             <a:endParaRPr lang="en-US"/>
           </a:p>
@@ -1725,7 +1725,7 @@
           <a:p>
             <a:fld id="{FD9117CB-CD87-A145-B0DD-B1FF23D56DC0}" type="datetimeFigureOut">
               <a:rPr lang="en-US" smtClean="0"/>
-              <a:t>9/10/2018</a:t>
+              <a:t>9/27/2018</a:t>
             </a:fld>
             <a:endParaRPr lang="en-US"/>
           </a:p>
@@ -1820,7 +1820,7 @@
           <a:p>
             <a:fld id="{FD9117CB-CD87-A145-B0DD-B1FF23D56DC0}" type="datetimeFigureOut">
               <a:rPr lang="en-US" smtClean="0"/>
-              <a:t>9/10/2018</a:t>
+              <a:t>9/27/2018</a:t>
             </a:fld>
             <a:endParaRPr lang="en-US"/>
           </a:p>
@@ -2097,7 +2097,7 @@
           <a:p>
             <a:fld id="{FD9117CB-CD87-A145-B0DD-B1FF23D56DC0}" type="datetimeFigureOut">
               <a:rPr lang="en-US" smtClean="0"/>
-              <a:t>9/10/2018</a:t>
+              <a:t>9/27/2018</a:t>
             </a:fld>
             <a:endParaRPr lang="en-US"/>
           </a:p>
@@ -2354,7 +2354,7 @@
           <a:p>
             <a:fld id="{FD9117CB-CD87-A145-B0DD-B1FF23D56DC0}" type="datetimeFigureOut">
               <a:rPr lang="en-US" smtClean="0"/>
-              <a:t>9/10/2018</a:t>
+              <a:t>9/27/2018</a:t>
             </a:fld>
             <a:endParaRPr lang="en-US"/>
           </a:p>
@@ -2567,7 +2567,7 @@
           <a:p>
             <a:fld id="{FD9117CB-CD87-A145-B0DD-B1FF23D56DC0}" type="datetimeFigureOut">
               <a:rPr lang="en-US" smtClean="0"/>
-              <a:t>9/10/2018</a:t>
+              <a:t>9/27/2018</a:t>
             </a:fld>
             <a:endParaRPr lang="en-US"/>
           </a:p>
@@ -3129,7 +3129,7 @@
           <a:p>
             <a:r>
               <a:rPr lang="en-US" sz="1050"/>
-              <a:t>Version 1.2</a:t>
+              <a:t>Version 2.0</a:t>
             </a:r>
             <a:endParaRPr lang="en-US" sz="1050" dirty="0"/>
           </a:p>

</xml_diff>

<commit_message>
Updates to projects and manual for chapter 4D.
</commit_message>
<xml_diff>
--- a/labmanual/English/WBT101-Binder-Cover.pptx
+++ b/labmanual/English/WBT101-Binder-Cover.pptx
@@ -244,7 +244,7 @@
           <a:p>
             <a:fld id="{FD9117CB-CD87-A145-B0DD-B1FF23D56DC0}" type="datetimeFigureOut">
               <a:rPr lang="en-US" smtClean="0"/>
-              <a:t>9/27/2018</a:t>
+              <a:t>10/2/2018</a:t>
             </a:fld>
             <a:endParaRPr lang="en-US"/>
           </a:p>
@@ -414,7 +414,7 @@
           <a:p>
             <a:fld id="{FD9117CB-CD87-A145-B0DD-B1FF23D56DC0}" type="datetimeFigureOut">
               <a:rPr lang="en-US" smtClean="0"/>
-              <a:t>9/27/2018</a:t>
+              <a:t>10/2/2018</a:t>
             </a:fld>
             <a:endParaRPr lang="en-US"/>
           </a:p>
@@ -594,7 +594,7 @@
           <a:p>
             <a:fld id="{FD9117CB-CD87-A145-B0DD-B1FF23D56DC0}" type="datetimeFigureOut">
               <a:rPr lang="en-US" smtClean="0"/>
-              <a:t>9/27/2018</a:t>
+              <a:t>10/2/2018</a:t>
             </a:fld>
             <a:endParaRPr lang="en-US"/>
           </a:p>
@@ -764,7 +764,7 @@
           <a:p>
             <a:fld id="{FD9117CB-CD87-A145-B0DD-B1FF23D56DC0}" type="datetimeFigureOut">
               <a:rPr lang="en-US" smtClean="0"/>
-              <a:t>9/27/2018</a:t>
+              <a:t>10/2/2018</a:t>
             </a:fld>
             <a:endParaRPr lang="en-US"/>
           </a:p>
@@ -1008,7 +1008,7 @@
           <a:p>
             <a:fld id="{FD9117CB-CD87-A145-B0DD-B1FF23D56DC0}" type="datetimeFigureOut">
               <a:rPr lang="en-US" smtClean="0"/>
-              <a:t>9/27/2018</a:t>
+              <a:t>10/2/2018</a:t>
             </a:fld>
             <a:endParaRPr lang="en-US"/>
           </a:p>
@@ -1240,7 +1240,7 @@
           <a:p>
             <a:fld id="{FD9117CB-CD87-A145-B0DD-B1FF23D56DC0}" type="datetimeFigureOut">
               <a:rPr lang="en-US" smtClean="0"/>
-              <a:t>9/27/2018</a:t>
+              <a:t>10/2/2018</a:t>
             </a:fld>
             <a:endParaRPr lang="en-US"/>
           </a:p>
@@ -1607,7 +1607,7 @@
           <a:p>
             <a:fld id="{FD9117CB-CD87-A145-B0DD-B1FF23D56DC0}" type="datetimeFigureOut">
               <a:rPr lang="en-US" smtClean="0"/>
-              <a:t>9/27/2018</a:t>
+              <a:t>10/2/2018</a:t>
             </a:fld>
             <a:endParaRPr lang="en-US"/>
           </a:p>
@@ -1725,7 +1725,7 @@
           <a:p>
             <a:fld id="{FD9117CB-CD87-A145-B0DD-B1FF23D56DC0}" type="datetimeFigureOut">
               <a:rPr lang="en-US" smtClean="0"/>
-              <a:t>9/27/2018</a:t>
+              <a:t>10/2/2018</a:t>
             </a:fld>
             <a:endParaRPr lang="en-US"/>
           </a:p>
@@ -1820,7 +1820,7 @@
           <a:p>
             <a:fld id="{FD9117CB-CD87-A145-B0DD-B1FF23D56DC0}" type="datetimeFigureOut">
               <a:rPr lang="en-US" smtClean="0"/>
-              <a:t>9/27/2018</a:t>
+              <a:t>10/2/2018</a:t>
             </a:fld>
             <a:endParaRPr lang="en-US"/>
           </a:p>
@@ -2097,7 +2097,7 @@
           <a:p>
             <a:fld id="{FD9117CB-CD87-A145-B0DD-B1FF23D56DC0}" type="datetimeFigureOut">
               <a:rPr lang="en-US" smtClean="0"/>
-              <a:t>9/27/2018</a:t>
+              <a:t>10/2/2018</a:t>
             </a:fld>
             <a:endParaRPr lang="en-US"/>
           </a:p>
@@ -2354,7 +2354,7 @@
           <a:p>
             <a:fld id="{FD9117CB-CD87-A145-B0DD-B1FF23D56DC0}" type="datetimeFigureOut">
               <a:rPr lang="en-US" smtClean="0"/>
-              <a:t>9/27/2018</a:t>
+              <a:t>10/2/2018</a:t>
             </a:fld>
             <a:endParaRPr lang="en-US"/>
           </a:p>
@@ -2567,7 +2567,7 @@
           <a:p>
             <a:fld id="{FD9117CB-CD87-A145-B0DD-B1FF23D56DC0}" type="datetimeFigureOut">
               <a:rPr lang="en-US" smtClean="0"/>
-              <a:t>9/27/2018</a:t>
+              <a:t>10/2/2018</a:t>
             </a:fld>
             <a:endParaRPr lang="en-US"/>
           </a:p>
@@ -3041,8 +3041,8 @@
         </p:nvSpPr>
         <p:spPr>
           <a:xfrm>
-            <a:off x="-19684" y="6785672"/>
-            <a:ext cx="6858000" cy="2308324"/>
+            <a:off x="-19684" y="7338330"/>
+            <a:ext cx="6858000" cy="830997"/>
           </a:xfrm>
           <a:prstGeom prst="rect">
             <a:avLst/>
@@ -3064,36 +3064,8 @@
           <a:p>
             <a:pPr algn="ctr"/>
             <a:r>
-              <a:rPr lang="en-US" sz="2400" dirty="0"/>
+              <a:rPr lang="en-US" sz="2400"/>
               <a:t>Greg Landry</a:t>
-            </a:r>
-          </a:p>
-          <a:p>
-            <a:pPr algn="ctr"/>
-            <a:r>
-              <a:rPr lang="en-US" sz="2400"/>
-              <a:t>Mark Saunders</a:t>
-            </a:r>
-          </a:p>
-          <a:p>
-            <a:pPr algn="ctr"/>
-            <a:r>
-              <a:rPr lang="en-US" sz="2400"/>
-              <a:t>Wesley Siebenthaler</a:t>
-            </a:r>
-          </a:p>
-          <a:p>
-            <a:pPr algn="ctr"/>
-            <a:r>
-              <a:rPr lang="en-US" sz="2400"/>
-              <a:t>Santhosh Vojjala</a:t>
-            </a:r>
-          </a:p>
-          <a:p>
-            <a:pPr algn="ctr"/>
-            <a:r>
-              <a:rPr lang="en-US" sz="2400"/>
-              <a:t>Vikram Ramanna</a:t>
             </a:r>
             <a:endParaRPr lang="en-US" sz="2400" dirty="0"/>
           </a:p>
@@ -3165,6 +3137,113 @@
           <a:chExt cx="0" cy="0"/>
         </a:xfrm>
       </p:grpSpPr>
+      <p:sp>
+        <p:nvSpPr>
+          <p:cNvPr id="2" name="TextBox 1">
+            <a:extLst>
+              <a:ext uri="{FF2B5EF4-FFF2-40B4-BE49-F238E27FC236}">
+                <a16:creationId xmlns:a16="http://schemas.microsoft.com/office/drawing/2014/main" id="{1DB73B94-F562-4580-B75B-1A4DD6109FB0}"/>
+              </a:ext>
+            </a:extLst>
+          </p:cNvPr>
+          <p:cNvSpPr txBox="1"/>
+          <p:nvPr/>
+        </p:nvSpPr>
+        <p:spPr>
+          <a:xfrm>
+            <a:off x="472273" y="974690"/>
+            <a:ext cx="5918479" cy="3293209"/>
+          </a:xfrm>
+          <a:prstGeom prst="rect">
+            <a:avLst/>
+          </a:prstGeom>
+          <a:noFill/>
+        </p:spPr>
+        <p:txBody>
+          <a:bodyPr wrap="square" rtlCol="0">
+            <a:spAutoFit/>
+          </a:bodyPr>
+          <a:lstStyle/>
+          <a:p>
+            <a:r>
+              <a:rPr lang="en-US" sz="1100"/>
+              <a:t>While there are only two names on the cover of this manual, it would not have been possible without a huge amount of help from many brilliant and dedicated Cypress engineers. A few of the individuals who made this possible are:</a:t>
+            </a:r>
+          </a:p>
+          <a:p>
+            <a:r>
+              <a:rPr lang="en-US" sz="1000"/>
+              <a:t> </a:t>
+            </a:r>
+          </a:p>
+          <a:p>
+            <a:r>
+              <a:rPr lang="en-US" sz="1100"/>
+              <a:t>Victor Zhodzishsky, Ash Kapur, Arvind Sridharan, Narasimha Rao and Vikram Ramana for countless descriptions, explanations, and examples.</a:t>
+            </a:r>
+          </a:p>
+          <a:p>
+            <a:r>
+              <a:rPr lang="en-US" sz="1100"/>
+              <a:t> </a:t>
+            </a:r>
+          </a:p>
+          <a:p>
+            <a:r>
+              <a:rPr lang="en-US" sz="1100"/>
+              <a:t>Mark Saunders and Wesley Siebenthaler for tirelessly going through the book and examples as  our alpha testers (and beta testers, and gamma testers…)</a:t>
+            </a:r>
+          </a:p>
+          <a:p>
+            <a:r>
+              <a:rPr lang="en-US" sz="1100"/>
+              <a:t> </a:t>
+            </a:r>
+          </a:p>
+          <a:p>
+            <a:r>
+              <a:rPr lang="en-US" sz="1100"/>
+              <a:t>Abhishek Khinversa and Srikanth Neerella for help understanding how to optimize for low power in BLE designs.</a:t>
+            </a:r>
+          </a:p>
+          <a:p>
+            <a:r>
+              <a:rPr lang="en-US" sz="1100"/>
+              <a:t> </a:t>
+            </a:r>
+          </a:p>
+          <a:p>
+            <a:r>
+              <a:rPr lang="en-US" sz="1100"/>
+              <a:t>Santhosh Kumar Vojjala for insight into the world of Classic Bluetooth.</a:t>
+            </a:r>
+          </a:p>
+          <a:p>
+            <a:r>
+              <a:rPr lang="en-US" sz="1100"/>
+              <a:t> </a:t>
+            </a:r>
+          </a:p>
+          <a:p>
+            <a:r>
+              <a:rPr lang="en-US" sz="1100"/>
+              <a:t>Nancy Jenkins for working out all the details to print such an awesome looking book. </a:t>
+            </a:r>
+          </a:p>
+          <a:p>
+            <a:r>
+              <a:rPr lang="en-US" sz="1100"/>
+              <a:t> </a:t>
+            </a:r>
+          </a:p>
+          <a:p>
+            <a:r>
+              <a:rPr lang="en-US" sz="1100"/>
+              <a:t>One final additional thank you to Victor and Ash for helping to define and write the Bluetooth specification – without them, Bluetooth as we know I today would not even exist.</a:t>
+            </a:r>
+          </a:p>
+        </p:txBody>
+      </p:sp>
     </p:spTree>
     <p:extLst>
       <p:ext uri="{BB962C8B-B14F-4D97-AF65-F5344CB8AC3E}">

</xml_diff>

<commit_message>
Major overhaul for version 3.0.
</commit_message>
<xml_diff>
--- a/labmanual/English/WBT101-Binder-Cover.pptx
+++ b/labmanual/English/WBT101-Binder-Cover.pptx
@@ -244,7 +244,7 @@
           <a:p>
             <a:fld id="{FD9117CB-CD87-A145-B0DD-B1FF23D56DC0}" type="datetimeFigureOut">
               <a:rPr lang="en-US" smtClean="0"/>
-              <a:t>10/4/2018</a:t>
+              <a:t>11/15/2018</a:t>
             </a:fld>
             <a:endParaRPr lang="en-US"/>
           </a:p>
@@ -414,7 +414,7 @@
           <a:p>
             <a:fld id="{FD9117CB-CD87-A145-B0DD-B1FF23D56DC0}" type="datetimeFigureOut">
               <a:rPr lang="en-US" smtClean="0"/>
-              <a:t>10/4/2018</a:t>
+              <a:t>11/15/2018</a:t>
             </a:fld>
             <a:endParaRPr lang="en-US"/>
           </a:p>
@@ -594,7 +594,7 @@
           <a:p>
             <a:fld id="{FD9117CB-CD87-A145-B0DD-B1FF23D56DC0}" type="datetimeFigureOut">
               <a:rPr lang="en-US" smtClean="0"/>
-              <a:t>10/4/2018</a:t>
+              <a:t>11/15/2018</a:t>
             </a:fld>
             <a:endParaRPr lang="en-US"/>
           </a:p>
@@ -764,7 +764,7 @@
           <a:p>
             <a:fld id="{FD9117CB-CD87-A145-B0DD-B1FF23D56DC0}" type="datetimeFigureOut">
               <a:rPr lang="en-US" smtClean="0"/>
-              <a:t>10/4/2018</a:t>
+              <a:t>11/15/2018</a:t>
             </a:fld>
             <a:endParaRPr lang="en-US"/>
           </a:p>
@@ -1008,7 +1008,7 @@
           <a:p>
             <a:fld id="{FD9117CB-CD87-A145-B0DD-B1FF23D56DC0}" type="datetimeFigureOut">
               <a:rPr lang="en-US" smtClean="0"/>
-              <a:t>10/4/2018</a:t>
+              <a:t>11/15/2018</a:t>
             </a:fld>
             <a:endParaRPr lang="en-US"/>
           </a:p>
@@ -1240,7 +1240,7 @@
           <a:p>
             <a:fld id="{FD9117CB-CD87-A145-B0DD-B1FF23D56DC0}" type="datetimeFigureOut">
               <a:rPr lang="en-US" smtClean="0"/>
-              <a:t>10/4/2018</a:t>
+              <a:t>11/15/2018</a:t>
             </a:fld>
             <a:endParaRPr lang="en-US"/>
           </a:p>
@@ -1607,7 +1607,7 @@
           <a:p>
             <a:fld id="{FD9117CB-CD87-A145-B0DD-B1FF23D56DC0}" type="datetimeFigureOut">
               <a:rPr lang="en-US" smtClean="0"/>
-              <a:t>10/4/2018</a:t>
+              <a:t>11/15/2018</a:t>
             </a:fld>
             <a:endParaRPr lang="en-US"/>
           </a:p>
@@ -1725,7 +1725,7 @@
           <a:p>
             <a:fld id="{FD9117CB-CD87-A145-B0DD-B1FF23D56DC0}" type="datetimeFigureOut">
               <a:rPr lang="en-US" smtClean="0"/>
-              <a:t>10/4/2018</a:t>
+              <a:t>11/15/2018</a:t>
             </a:fld>
             <a:endParaRPr lang="en-US"/>
           </a:p>
@@ -1820,7 +1820,7 @@
           <a:p>
             <a:fld id="{FD9117CB-CD87-A145-B0DD-B1FF23D56DC0}" type="datetimeFigureOut">
               <a:rPr lang="en-US" smtClean="0"/>
-              <a:t>10/4/2018</a:t>
+              <a:t>11/15/2018</a:t>
             </a:fld>
             <a:endParaRPr lang="en-US"/>
           </a:p>
@@ -2097,7 +2097,7 @@
           <a:p>
             <a:fld id="{FD9117CB-CD87-A145-B0DD-B1FF23D56DC0}" type="datetimeFigureOut">
               <a:rPr lang="en-US" smtClean="0"/>
-              <a:t>10/4/2018</a:t>
+              <a:t>11/15/2018</a:t>
             </a:fld>
             <a:endParaRPr lang="en-US"/>
           </a:p>
@@ -2354,7 +2354,7 @@
           <a:p>
             <a:fld id="{FD9117CB-CD87-A145-B0DD-B1FF23D56DC0}" type="datetimeFigureOut">
               <a:rPr lang="en-US" smtClean="0"/>
-              <a:t>10/4/2018</a:t>
+              <a:t>11/15/2018</a:t>
             </a:fld>
             <a:endParaRPr lang="en-US"/>
           </a:p>
@@ -2567,7 +2567,7 @@
           <a:p>
             <a:fld id="{FD9117CB-CD87-A145-B0DD-B1FF23D56DC0}" type="datetimeFigureOut">
               <a:rPr lang="en-US" smtClean="0"/>
-              <a:t>10/4/2018</a:t>
+              <a:t>11/15/2018</a:t>
             </a:fld>
             <a:endParaRPr lang="en-US"/>
           </a:p>
@@ -3100,10 +3100,9 @@
           <a:lstStyle/>
           <a:p>
             <a:r>
-              <a:rPr lang="en-US" sz="1050"/>
-              <a:t>Version 2.0</a:t>
-            </a:r>
-            <a:endParaRPr lang="en-US" sz="1050" dirty="0"/>
+              <a:rPr lang="en-US" sz="1050" dirty="0"/>
+              <a:t>Version 3.0</a:t>
+            </a:r>
           </a:p>
         </p:txBody>
       </p:sp>
@@ -3167,116 +3166,124 @@
           <a:p>
             <a:pPr algn="just"/>
             <a:r>
-              <a:rPr lang="en-US" sz="1100"/>
+              <a:rPr lang="en-US" sz="1100" dirty="0"/>
               <a:t>For me, Cypress has always been about the people.  Greg and I have now been friends for more than half of our lives and there is not a day that goes by that I am not grateful for that friendship as well as his engineering abilities.  Together we have put our hearts and souls into making this book a reality. </a:t>
             </a:r>
           </a:p>
           <a:p>
             <a:pPr algn="just"/>
-            <a:endParaRPr lang="en-US" sz="1100"/>
+            <a:endParaRPr lang="en-US" sz="1100" dirty="0"/>
           </a:p>
           <a:p>
             <a:pPr algn="just"/>
             <a:r>
-              <a:rPr lang="en-US" sz="1100"/>
+              <a:rPr lang="en-US" sz="1100" dirty="0"/>
               <a:t>This would not have been possible without the several hundred remarkable people who joined Cypress as part of the Broadcom IoT acquisition in the Summer of 2016.  Cypress can be a prickly place to work, yet these people showed their integrity by choosing to overcome those barriers. </a:t>
             </a:r>
           </a:p>
           <a:p>
             <a:pPr algn="just"/>
-            <a:endParaRPr lang="en-US" sz="1100"/>
+            <a:endParaRPr lang="en-US" sz="1100" dirty="0"/>
           </a:p>
           <a:p>
             <a:pPr algn="just"/>
             <a:r>
-              <a:rPr lang="en-US" sz="1100"/>
+              <a:rPr lang="en-US" sz="1100" dirty="0"/>
               <a:t>There are number of people, in particular, without whom we would have never sorted this out.  That list includes: </a:t>
             </a:r>
           </a:p>
           <a:p>
             <a:pPr algn="just"/>
-            <a:endParaRPr lang="en-US" sz="1100"/>
+            <a:endParaRPr lang="en-US" sz="1100" dirty="0"/>
           </a:p>
           <a:p>
             <a:pPr algn="just"/>
             <a:r>
-              <a:rPr lang="en-US" sz="1100"/>
-              <a:t>Victor Zhodzishsky, Ash Kapur, Arvind Sridharan, Narasimha Rao and Vikram Ramana for their countless descriptions, explanations, and examples. </a:t>
+              <a:rPr lang="en-US" sz="1100" dirty="0"/>
+              <a:t>Victor Zhodzishsky, Ash Kapur, Arvind Sridharan, Narasimha Rao and Vikram Ramanna for their countless descriptions, explanations, and examples. </a:t>
             </a:r>
           </a:p>
           <a:p>
             <a:pPr algn="just"/>
-            <a:endParaRPr lang="en-US" sz="1100"/>
+            <a:endParaRPr lang="en-US" sz="1100" dirty="0"/>
           </a:p>
           <a:p>
             <a:pPr algn="just"/>
             <a:r>
-              <a:rPr lang="en-US" sz="1100"/>
+              <a:rPr lang="en-US" sz="1100" dirty="0"/>
               <a:t>Mark Saunders and Wesley Siebenthaler for putting up with Alan and persevering  through countless revisions of the book and examples as our alpha testers (and beta testers, and gamma testers…) </a:t>
             </a:r>
           </a:p>
           <a:p>
             <a:pPr algn="just"/>
-            <a:endParaRPr lang="en-US" sz="1100"/>
+            <a:endParaRPr lang="en-US" sz="1100" dirty="0"/>
           </a:p>
           <a:p>
             <a:pPr algn="just"/>
             <a:r>
-              <a:rPr lang="en-US" sz="1100"/>
-              <a:t>Abhishek Khinversa and Srikanth Neerella for their understanding of optimizing for low power in BLE designs and Santhosh Kumar Vojjala for insight into the world of Classic Bluetooth. </a:t>
+              <a:rPr lang="en-US" sz="1100" dirty="0"/>
+              <a:t>Abhishek </a:t>
+            </a:r>
+            <a:r>
+              <a:rPr lang="en-US" sz="1100" dirty="0" err="1"/>
+              <a:t>Khinversa</a:t>
+            </a:r>
+            <a:r>
+              <a:rPr lang="en-US" sz="1100" dirty="0"/>
+              <a:t> and Srikanth Neerella for their understanding of optimizing for low power in BLE designs and Santhosh Kumar Vojjala for insight into the world of Classic Bluetooth. </a:t>
             </a:r>
           </a:p>
           <a:p>
             <a:pPr algn="just"/>
-            <a:endParaRPr lang="en-US" sz="1100"/>
+            <a:endParaRPr lang="en-US" sz="1100" dirty="0"/>
           </a:p>
           <a:p>
             <a:pPr algn="just"/>
             <a:r>
-              <a:rPr lang="en-US" sz="1100"/>
+              <a:rPr lang="en-US" sz="1100" dirty="0"/>
               <a:t>Nancy Jenkins for putting up with a continuous stream of last second changes and unreasonable demands. </a:t>
             </a:r>
           </a:p>
           <a:p>
             <a:pPr algn="just"/>
-            <a:endParaRPr lang="en-US" sz="1100"/>
+            <a:endParaRPr lang="en-US" sz="1100" dirty="0"/>
           </a:p>
           <a:p>
             <a:pPr algn="just"/>
             <a:r>
-              <a:rPr lang="en-US" sz="1100"/>
+              <a:rPr lang="en-US" sz="1100" dirty="0"/>
               <a:t>One final additional thank you to Victor and Ash who started working on the Bluetooth Specifications at the very beginning.  Without their contributions, WICED &amp; Bluetooth as we know it today would not exist. </a:t>
             </a:r>
           </a:p>
           <a:p>
             <a:pPr algn="just"/>
-            <a:endParaRPr lang="en-US" sz="1100"/>
+            <a:endParaRPr lang="en-US" sz="1100" dirty="0"/>
           </a:p>
           <a:p>
             <a:pPr algn="just"/>
             <a:r>
-              <a:rPr lang="en-US" sz="1100"/>
+              <a:rPr lang="en-US" sz="1100" dirty="0"/>
               <a:t>The IoT is a once in a generation opportunity for which Cypress is almost uniquely suited to take advantage of.  We have the right chips,  software, people and leadership to be a transformational force.  It is our sincere hope that this book eases your journey to that place of greatness. </a:t>
             </a:r>
           </a:p>
           <a:p>
-            <a:endParaRPr lang="en-US" sz="1100"/>
-          </a:p>
-          <a:p>
-            <a:r>
-              <a:rPr lang="en-US" sz="1100"/>
+            <a:endParaRPr lang="en-US" sz="1100" dirty="0"/>
+          </a:p>
+          <a:p>
+            <a:r>
+              <a:rPr lang="en-US" sz="1100" dirty="0"/>
               <a:t>Alan Hawse </a:t>
             </a:r>
           </a:p>
           <a:p>
             <a:r>
-              <a:rPr lang="en-US" sz="1100"/>
+              <a:rPr lang="en-US" sz="1100" dirty="0"/>
               <a:t>Greg Landry </a:t>
             </a:r>
           </a:p>
           <a:p>
             <a:r>
-              <a:rPr lang="en-US" sz="1100"/>
+              <a:rPr lang="en-US" sz="1100" dirty="0"/>
               <a:t>Kentucky, Fall 2018 </a:t>
             </a:r>
           </a:p>

</xml_diff>

<commit_message>
Update rev from 3.0 to 3.1 after 18Q4 India edits.
</commit_message>
<xml_diff>
--- a/labmanual/English/WBT101-Binder-Cover.pptx
+++ b/labmanual/English/WBT101-Binder-Cover.pptx
@@ -244,7 +244,7 @@
           <a:p>
             <a:fld id="{FD9117CB-CD87-A145-B0DD-B1FF23D56DC0}" type="datetimeFigureOut">
               <a:rPr lang="en-US" smtClean="0"/>
-              <a:t>11/15/2018</a:t>
+              <a:t>1/9/2019</a:t>
             </a:fld>
             <a:endParaRPr lang="en-US"/>
           </a:p>
@@ -414,7 +414,7 @@
           <a:p>
             <a:fld id="{FD9117CB-CD87-A145-B0DD-B1FF23D56DC0}" type="datetimeFigureOut">
               <a:rPr lang="en-US" smtClean="0"/>
-              <a:t>11/15/2018</a:t>
+              <a:t>1/9/2019</a:t>
             </a:fld>
             <a:endParaRPr lang="en-US"/>
           </a:p>
@@ -594,7 +594,7 @@
           <a:p>
             <a:fld id="{FD9117CB-CD87-A145-B0DD-B1FF23D56DC0}" type="datetimeFigureOut">
               <a:rPr lang="en-US" smtClean="0"/>
-              <a:t>11/15/2018</a:t>
+              <a:t>1/9/2019</a:t>
             </a:fld>
             <a:endParaRPr lang="en-US"/>
           </a:p>
@@ -764,7 +764,7 @@
           <a:p>
             <a:fld id="{FD9117CB-CD87-A145-B0DD-B1FF23D56DC0}" type="datetimeFigureOut">
               <a:rPr lang="en-US" smtClean="0"/>
-              <a:t>11/15/2018</a:t>
+              <a:t>1/9/2019</a:t>
             </a:fld>
             <a:endParaRPr lang="en-US"/>
           </a:p>
@@ -1008,7 +1008,7 @@
           <a:p>
             <a:fld id="{FD9117CB-CD87-A145-B0DD-B1FF23D56DC0}" type="datetimeFigureOut">
               <a:rPr lang="en-US" smtClean="0"/>
-              <a:t>11/15/2018</a:t>
+              <a:t>1/9/2019</a:t>
             </a:fld>
             <a:endParaRPr lang="en-US"/>
           </a:p>
@@ -1240,7 +1240,7 @@
           <a:p>
             <a:fld id="{FD9117CB-CD87-A145-B0DD-B1FF23D56DC0}" type="datetimeFigureOut">
               <a:rPr lang="en-US" smtClean="0"/>
-              <a:t>11/15/2018</a:t>
+              <a:t>1/9/2019</a:t>
             </a:fld>
             <a:endParaRPr lang="en-US"/>
           </a:p>
@@ -1607,7 +1607,7 @@
           <a:p>
             <a:fld id="{FD9117CB-CD87-A145-B0DD-B1FF23D56DC0}" type="datetimeFigureOut">
               <a:rPr lang="en-US" smtClean="0"/>
-              <a:t>11/15/2018</a:t>
+              <a:t>1/9/2019</a:t>
             </a:fld>
             <a:endParaRPr lang="en-US"/>
           </a:p>
@@ -1725,7 +1725,7 @@
           <a:p>
             <a:fld id="{FD9117CB-CD87-A145-B0DD-B1FF23D56DC0}" type="datetimeFigureOut">
               <a:rPr lang="en-US" smtClean="0"/>
-              <a:t>11/15/2018</a:t>
+              <a:t>1/9/2019</a:t>
             </a:fld>
             <a:endParaRPr lang="en-US"/>
           </a:p>
@@ -1820,7 +1820,7 @@
           <a:p>
             <a:fld id="{FD9117CB-CD87-A145-B0DD-B1FF23D56DC0}" type="datetimeFigureOut">
               <a:rPr lang="en-US" smtClean="0"/>
-              <a:t>11/15/2018</a:t>
+              <a:t>1/9/2019</a:t>
             </a:fld>
             <a:endParaRPr lang="en-US"/>
           </a:p>
@@ -2097,7 +2097,7 @@
           <a:p>
             <a:fld id="{FD9117CB-CD87-A145-B0DD-B1FF23D56DC0}" type="datetimeFigureOut">
               <a:rPr lang="en-US" smtClean="0"/>
-              <a:t>11/15/2018</a:t>
+              <a:t>1/9/2019</a:t>
             </a:fld>
             <a:endParaRPr lang="en-US"/>
           </a:p>
@@ -2354,7 +2354,7 @@
           <a:p>
             <a:fld id="{FD9117CB-CD87-A145-B0DD-B1FF23D56DC0}" type="datetimeFigureOut">
               <a:rPr lang="en-US" smtClean="0"/>
-              <a:t>11/15/2018</a:t>
+              <a:t>1/9/2019</a:t>
             </a:fld>
             <a:endParaRPr lang="en-US"/>
           </a:p>
@@ -2567,7 +2567,7 @@
           <a:p>
             <a:fld id="{FD9117CB-CD87-A145-B0DD-B1FF23D56DC0}" type="datetimeFigureOut">
               <a:rPr lang="en-US" smtClean="0"/>
-              <a:t>11/15/2018</a:t>
+              <a:t>1/9/2019</a:t>
             </a:fld>
             <a:endParaRPr lang="en-US"/>
           </a:p>
@@ -3100,9 +3100,10 @@
           <a:lstStyle/>
           <a:p>
             <a:r>
-              <a:rPr lang="en-US" sz="1050" dirty="0"/>
-              <a:t>Version 3.0</a:t>
-            </a:r>
+              <a:rPr lang="en-US" sz="1050"/>
+              <a:t>Version 3.1</a:t>
+            </a:r>
+            <a:endParaRPr lang="en-US" sz="1050" dirty="0"/>
           </a:p>
         </p:txBody>
       </p:sp>

</xml_diff>

<commit_message>
Add new exercises in 7C, move 7B answers to the answer key. Add MDL to the acknowledgements. Fix pagination in debugging chapter.
</commit_message>
<xml_diff>
--- a/labmanual/English/WBT101-Binder-Cover.pptx
+++ b/labmanual/English/WBT101-Binder-Cover.pptx
@@ -244,7 +244,7 @@
           <a:p>
             <a:fld id="{FD9117CB-CD87-A145-B0DD-B1FF23D56DC0}" type="datetimeFigureOut">
               <a:rPr lang="en-US" smtClean="0"/>
-              <a:t>1/9/2019</a:t>
+              <a:t>4/1/2019</a:t>
             </a:fld>
             <a:endParaRPr lang="en-US"/>
           </a:p>
@@ -414,7 +414,7 @@
           <a:p>
             <a:fld id="{FD9117CB-CD87-A145-B0DD-B1FF23D56DC0}" type="datetimeFigureOut">
               <a:rPr lang="en-US" smtClean="0"/>
-              <a:t>1/9/2019</a:t>
+              <a:t>4/1/2019</a:t>
             </a:fld>
             <a:endParaRPr lang="en-US"/>
           </a:p>
@@ -594,7 +594,7 @@
           <a:p>
             <a:fld id="{FD9117CB-CD87-A145-B0DD-B1FF23D56DC0}" type="datetimeFigureOut">
               <a:rPr lang="en-US" smtClean="0"/>
-              <a:t>1/9/2019</a:t>
+              <a:t>4/1/2019</a:t>
             </a:fld>
             <a:endParaRPr lang="en-US"/>
           </a:p>
@@ -764,7 +764,7 @@
           <a:p>
             <a:fld id="{FD9117CB-CD87-A145-B0DD-B1FF23D56DC0}" type="datetimeFigureOut">
               <a:rPr lang="en-US" smtClean="0"/>
-              <a:t>1/9/2019</a:t>
+              <a:t>4/1/2019</a:t>
             </a:fld>
             <a:endParaRPr lang="en-US"/>
           </a:p>
@@ -1008,7 +1008,7 @@
           <a:p>
             <a:fld id="{FD9117CB-CD87-A145-B0DD-B1FF23D56DC0}" type="datetimeFigureOut">
               <a:rPr lang="en-US" smtClean="0"/>
-              <a:t>1/9/2019</a:t>
+              <a:t>4/1/2019</a:t>
             </a:fld>
             <a:endParaRPr lang="en-US"/>
           </a:p>
@@ -1240,7 +1240,7 @@
           <a:p>
             <a:fld id="{FD9117CB-CD87-A145-B0DD-B1FF23D56DC0}" type="datetimeFigureOut">
               <a:rPr lang="en-US" smtClean="0"/>
-              <a:t>1/9/2019</a:t>
+              <a:t>4/1/2019</a:t>
             </a:fld>
             <a:endParaRPr lang="en-US"/>
           </a:p>
@@ -1607,7 +1607,7 @@
           <a:p>
             <a:fld id="{FD9117CB-CD87-A145-B0DD-B1FF23D56DC0}" type="datetimeFigureOut">
               <a:rPr lang="en-US" smtClean="0"/>
-              <a:t>1/9/2019</a:t>
+              <a:t>4/1/2019</a:t>
             </a:fld>
             <a:endParaRPr lang="en-US"/>
           </a:p>
@@ -1725,7 +1725,7 @@
           <a:p>
             <a:fld id="{FD9117CB-CD87-A145-B0DD-B1FF23D56DC0}" type="datetimeFigureOut">
               <a:rPr lang="en-US" smtClean="0"/>
-              <a:t>1/9/2019</a:t>
+              <a:t>4/1/2019</a:t>
             </a:fld>
             <a:endParaRPr lang="en-US"/>
           </a:p>
@@ -1820,7 +1820,7 @@
           <a:p>
             <a:fld id="{FD9117CB-CD87-A145-B0DD-B1FF23D56DC0}" type="datetimeFigureOut">
               <a:rPr lang="en-US" smtClean="0"/>
-              <a:t>1/9/2019</a:t>
+              <a:t>4/1/2019</a:t>
             </a:fld>
             <a:endParaRPr lang="en-US"/>
           </a:p>
@@ -2097,7 +2097,7 @@
           <a:p>
             <a:fld id="{FD9117CB-CD87-A145-B0DD-B1FF23D56DC0}" type="datetimeFigureOut">
               <a:rPr lang="en-US" smtClean="0"/>
-              <a:t>1/9/2019</a:t>
+              <a:t>4/1/2019</a:t>
             </a:fld>
             <a:endParaRPr lang="en-US"/>
           </a:p>
@@ -2354,7 +2354,7 @@
           <a:p>
             <a:fld id="{FD9117CB-CD87-A145-B0DD-B1FF23D56DC0}" type="datetimeFigureOut">
               <a:rPr lang="en-US" smtClean="0"/>
-              <a:t>1/9/2019</a:t>
+              <a:t>4/1/2019</a:t>
             </a:fld>
             <a:endParaRPr lang="en-US"/>
           </a:p>
@@ -2567,7 +2567,7 @@
           <a:p>
             <a:fld id="{FD9117CB-CD87-A145-B0DD-B1FF23D56DC0}" type="datetimeFigureOut">
               <a:rPr lang="en-US" smtClean="0"/>
-              <a:t>1/9/2019</a:t>
+              <a:t>4/1/2019</a:t>
             </a:fld>
             <a:endParaRPr lang="en-US"/>
           </a:p>
@@ -3152,7 +3152,7 @@
         <p:spPr>
           <a:xfrm>
             <a:off x="472273" y="974690"/>
-            <a:ext cx="5918479" cy="6017032"/>
+            <a:ext cx="5918479" cy="6355586"/>
           </a:xfrm>
           <a:prstGeom prst="rect">
             <a:avLst/>
@@ -3232,6 +3232,25 @@
             <a:r>
               <a:rPr lang="en-US" sz="1100" dirty="0"/>
               <a:t> and Srikanth Neerella for their understanding of optimizing for low power in BLE designs and Santhosh Kumar Vojjala for insight into the world of Classic Bluetooth. </a:t>
+            </a:r>
+          </a:p>
+          <a:p>
+            <a:pPr algn="just"/>
+            <a:endParaRPr lang="en-US" sz="1100" dirty="0"/>
+          </a:p>
+          <a:p>
+            <a:pPr algn="just"/>
+            <a:r>
+              <a:rPr lang="en-US" sz="1100" dirty="0"/>
+              <a:t>Matt Landrum for providing lots of material for the conversion </a:t>
+            </a:r>
+            <a:r>
+              <a:rPr lang="en-US" sz="1100"/>
+              <a:t>of the </a:t>
+            </a:r>
+            <a:r>
+              <a:rPr lang="en-US" sz="1100" dirty="0"/>
+              <a:t>class from WICED Studio to ModusToolbox.</a:t>
             </a:r>
           </a:p>
           <a:p>

</xml_diff>

<commit_message>
Updates for MTB 1.1 and Mesh
</commit_message>
<xml_diff>
--- a/labmanual/English/WBT101-Binder-Cover.pptx
+++ b/labmanual/English/WBT101-Binder-Cover.pptx
@@ -244,7 +244,7 @@
           <a:p>
             <a:fld id="{FD9117CB-CD87-A145-B0DD-B1FF23D56DC0}" type="datetimeFigureOut">
               <a:rPr lang="en-US" smtClean="0"/>
-              <a:t>4/1/2019</a:t>
+              <a:t>4/3/2019</a:t>
             </a:fld>
             <a:endParaRPr lang="en-US"/>
           </a:p>
@@ -414,7 +414,7 @@
           <a:p>
             <a:fld id="{FD9117CB-CD87-A145-B0DD-B1FF23D56DC0}" type="datetimeFigureOut">
               <a:rPr lang="en-US" smtClean="0"/>
-              <a:t>4/1/2019</a:t>
+              <a:t>4/3/2019</a:t>
             </a:fld>
             <a:endParaRPr lang="en-US"/>
           </a:p>
@@ -594,7 +594,7 @@
           <a:p>
             <a:fld id="{FD9117CB-CD87-A145-B0DD-B1FF23D56DC0}" type="datetimeFigureOut">
               <a:rPr lang="en-US" smtClean="0"/>
-              <a:t>4/1/2019</a:t>
+              <a:t>4/3/2019</a:t>
             </a:fld>
             <a:endParaRPr lang="en-US"/>
           </a:p>
@@ -764,7 +764,7 @@
           <a:p>
             <a:fld id="{FD9117CB-CD87-A145-B0DD-B1FF23D56DC0}" type="datetimeFigureOut">
               <a:rPr lang="en-US" smtClean="0"/>
-              <a:t>4/1/2019</a:t>
+              <a:t>4/3/2019</a:t>
             </a:fld>
             <a:endParaRPr lang="en-US"/>
           </a:p>
@@ -1008,7 +1008,7 @@
           <a:p>
             <a:fld id="{FD9117CB-CD87-A145-B0DD-B1FF23D56DC0}" type="datetimeFigureOut">
               <a:rPr lang="en-US" smtClean="0"/>
-              <a:t>4/1/2019</a:t>
+              <a:t>4/3/2019</a:t>
             </a:fld>
             <a:endParaRPr lang="en-US"/>
           </a:p>
@@ -1240,7 +1240,7 @@
           <a:p>
             <a:fld id="{FD9117CB-CD87-A145-B0DD-B1FF23D56DC0}" type="datetimeFigureOut">
               <a:rPr lang="en-US" smtClean="0"/>
-              <a:t>4/1/2019</a:t>
+              <a:t>4/3/2019</a:t>
             </a:fld>
             <a:endParaRPr lang="en-US"/>
           </a:p>
@@ -1607,7 +1607,7 @@
           <a:p>
             <a:fld id="{FD9117CB-CD87-A145-B0DD-B1FF23D56DC0}" type="datetimeFigureOut">
               <a:rPr lang="en-US" smtClean="0"/>
-              <a:t>4/1/2019</a:t>
+              <a:t>4/3/2019</a:t>
             </a:fld>
             <a:endParaRPr lang="en-US"/>
           </a:p>
@@ -1725,7 +1725,7 @@
           <a:p>
             <a:fld id="{FD9117CB-CD87-A145-B0DD-B1FF23D56DC0}" type="datetimeFigureOut">
               <a:rPr lang="en-US" smtClean="0"/>
-              <a:t>4/1/2019</a:t>
+              <a:t>4/3/2019</a:t>
             </a:fld>
             <a:endParaRPr lang="en-US"/>
           </a:p>
@@ -1820,7 +1820,7 @@
           <a:p>
             <a:fld id="{FD9117CB-CD87-A145-B0DD-B1FF23D56DC0}" type="datetimeFigureOut">
               <a:rPr lang="en-US" smtClean="0"/>
-              <a:t>4/1/2019</a:t>
+              <a:t>4/3/2019</a:t>
             </a:fld>
             <a:endParaRPr lang="en-US"/>
           </a:p>
@@ -2097,7 +2097,7 @@
           <a:p>
             <a:fld id="{FD9117CB-CD87-A145-B0DD-B1FF23D56DC0}" type="datetimeFigureOut">
               <a:rPr lang="en-US" smtClean="0"/>
-              <a:t>4/1/2019</a:t>
+              <a:t>4/3/2019</a:t>
             </a:fld>
             <a:endParaRPr lang="en-US"/>
           </a:p>
@@ -2354,7 +2354,7 @@
           <a:p>
             <a:fld id="{FD9117CB-CD87-A145-B0DD-B1FF23D56DC0}" type="datetimeFigureOut">
               <a:rPr lang="en-US" smtClean="0"/>
-              <a:t>4/1/2019</a:t>
+              <a:t>4/3/2019</a:t>
             </a:fld>
             <a:endParaRPr lang="en-US"/>
           </a:p>
@@ -2567,7 +2567,7 @@
           <a:p>
             <a:fld id="{FD9117CB-CD87-A145-B0DD-B1FF23D56DC0}" type="datetimeFigureOut">
               <a:rPr lang="en-US" smtClean="0"/>
-              <a:t>4/1/2019</a:t>
+              <a:t>4/3/2019</a:t>
             </a:fld>
             <a:endParaRPr lang="en-US"/>
           </a:p>
@@ -3100,10 +3100,9 @@
           <a:lstStyle/>
           <a:p>
             <a:r>
-              <a:rPr lang="en-US" sz="1050"/>
-              <a:t>Version 3.1</a:t>
-            </a:r>
-            <a:endParaRPr lang="en-US" sz="1050" dirty="0"/>
+              <a:rPr lang="en-US" sz="1050" dirty="0"/>
+              <a:t>Version 4.0</a:t>
+            </a:r>
           </a:p>
         </p:txBody>
       </p:sp>
@@ -3152,7 +3151,7 @@
         <p:spPr>
           <a:xfrm>
             <a:off x="472273" y="974690"/>
-            <a:ext cx="5918479" cy="6355586"/>
+            <a:ext cx="5918479" cy="6524863"/>
           </a:xfrm>
           <a:prstGeom prst="rect">
             <a:avLst/>
@@ -3223,6 +3222,17 @@
             <a:pPr algn="just"/>
             <a:r>
               <a:rPr lang="en-US" sz="1100" dirty="0"/>
+              <a:t>Matt Landrum, Scott Atkins, and Raul Hernandez for providing material and comments for the conversion of the class from WICED Studio to ModusToolbox.</a:t>
+            </a:r>
+          </a:p>
+          <a:p>
+            <a:pPr algn="just"/>
+            <a:endParaRPr lang="en-US" sz="1100" dirty="0"/>
+          </a:p>
+          <a:p>
+            <a:pPr algn="just"/>
+            <a:r>
+              <a:rPr lang="en-US" sz="1100" dirty="0"/>
               <a:t>Abhishek </a:t>
             </a:r>
             <a:r>
@@ -3232,25 +3242,6 @@
             <a:r>
               <a:rPr lang="en-US" sz="1100" dirty="0"/>
               <a:t> and Srikanth Neerella for their understanding of optimizing for low power in BLE designs and Santhosh Kumar Vojjala for insight into the world of Classic Bluetooth. </a:t>
-            </a:r>
-          </a:p>
-          <a:p>
-            <a:pPr algn="just"/>
-            <a:endParaRPr lang="en-US" sz="1100" dirty="0"/>
-          </a:p>
-          <a:p>
-            <a:pPr algn="just"/>
-            <a:r>
-              <a:rPr lang="en-US" sz="1100" dirty="0"/>
-              <a:t>Matt Landrum for providing lots of material for the conversion </a:t>
-            </a:r>
-            <a:r>
-              <a:rPr lang="en-US" sz="1100"/>
-              <a:t>of the </a:t>
-            </a:r>
-            <a:r>
-              <a:rPr lang="en-US" sz="1100" dirty="0"/>
-              <a:t>class from WICED Studio to ModusToolbox.</a:t>
             </a:r>
           </a:p>
           <a:p>

</xml_diff>

<commit_message>
rename chapter 7 to be consistent. regenerate PDFs.
</commit_message>
<xml_diff>
--- a/labmanual/English/WBT101-Binder-Cover.pptx
+++ b/labmanual/English/WBT101-Binder-Cover.pptx
@@ -244,7 +244,7 @@
           <a:p>
             <a:fld id="{FD9117CB-CD87-A145-B0DD-B1FF23D56DC0}" type="datetimeFigureOut">
               <a:rPr lang="en-US" smtClean="0"/>
-              <a:t>4/3/2019</a:t>
+              <a:t>4/10/2019</a:t>
             </a:fld>
             <a:endParaRPr lang="en-US"/>
           </a:p>
@@ -414,7 +414,7 @@
           <a:p>
             <a:fld id="{FD9117CB-CD87-A145-B0DD-B1FF23D56DC0}" type="datetimeFigureOut">
               <a:rPr lang="en-US" smtClean="0"/>
-              <a:t>4/3/2019</a:t>
+              <a:t>4/10/2019</a:t>
             </a:fld>
             <a:endParaRPr lang="en-US"/>
           </a:p>
@@ -594,7 +594,7 @@
           <a:p>
             <a:fld id="{FD9117CB-CD87-A145-B0DD-B1FF23D56DC0}" type="datetimeFigureOut">
               <a:rPr lang="en-US" smtClean="0"/>
-              <a:t>4/3/2019</a:t>
+              <a:t>4/10/2019</a:t>
             </a:fld>
             <a:endParaRPr lang="en-US"/>
           </a:p>
@@ -764,7 +764,7 @@
           <a:p>
             <a:fld id="{FD9117CB-CD87-A145-B0DD-B1FF23D56DC0}" type="datetimeFigureOut">
               <a:rPr lang="en-US" smtClean="0"/>
-              <a:t>4/3/2019</a:t>
+              <a:t>4/10/2019</a:t>
             </a:fld>
             <a:endParaRPr lang="en-US"/>
           </a:p>
@@ -1008,7 +1008,7 @@
           <a:p>
             <a:fld id="{FD9117CB-CD87-A145-B0DD-B1FF23D56DC0}" type="datetimeFigureOut">
               <a:rPr lang="en-US" smtClean="0"/>
-              <a:t>4/3/2019</a:t>
+              <a:t>4/10/2019</a:t>
             </a:fld>
             <a:endParaRPr lang="en-US"/>
           </a:p>
@@ -1240,7 +1240,7 @@
           <a:p>
             <a:fld id="{FD9117CB-CD87-A145-B0DD-B1FF23D56DC0}" type="datetimeFigureOut">
               <a:rPr lang="en-US" smtClean="0"/>
-              <a:t>4/3/2019</a:t>
+              <a:t>4/10/2019</a:t>
             </a:fld>
             <a:endParaRPr lang="en-US"/>
           </a:p>
@@ -1607,7 +1607,7 @@
           <a:p>
             <a:fld id="{FD9117CB-CD87-A145-B0DD-B1FF23D56DC0}" type="datetimeFigureOut">
               <a:rPr lang="en-US" smtClean="0"/>
-              <a:t>4/3/2019</a:t>
+              <a:t>4/10/2019</a:t>
             </a:fld>
             <a:endParaRPr lang="en-US"/>
           </a:p>
@@ -1725,7 +1725,7 @@
           <a:p>
             <a:fld id="{FD9117CB-CD87-A145-B0DD-B1FF23D56DC0}" type="datetimeFigureOut">
               <a:rPr lang="en-US" smtClean="0"/>
-              <a:t>4/3/2019</a:t>
+              <a:t>4/10/2019</a:t>
             </a:fld>
             <a:endParaRPr lang="en-US"/>
           </a:p>
@@ -1820,7 +1820,7 @@
           <a:p>
             <a:fld id="{FD9117CB-CD87-A145-B0DD-B1FF23D56DC0}" type="datetimeFigureOut">
               <a:rPr lang="en-US" smtClean="0"/>
-              <a:t>4/3/2019</a:t>
+              <a:t>4/10/2019</a:t>
             </a:fld>
             <a:endParaRPr lang="en-US"/>
           </a:p>
@@ -2097,7 +2097,7 @@
           <a:p>
             <a:fld id="{FD9117CB-CD87-A145-B0DD-B1FF23D56DC0}" type="datetimeFigureOut">
               <a:rPr lang="en-US" smtClean="0"/>
-              <a:t>4/3/2019</a:t>
+              <a:t>4/10/2019</a:t>
             </a:fld>
             <a:endParaRPr lang="en-US"/>
           </a:p>
@@ -2354,7 +2354,7 @@
           <a:p>
             <a:fld id="{FD9117CB-CD87-A145-B0DD-B1FF23D56DC0}" type="datetimeFigureOut">
               <a:rPr lang="en-US" smtClean="0"/>
-              <a:t>4/3/2019</a:t>
+              <a:t>4/10/2019</a:t>
             </a:fld>
             <a:endParaRPr lang="en-US"/>
           </a:p>
@@ -2567,7 +2567,7 @@
           <a:p>
             <a:fld id="{FD9117CB-CD87-A145-B0DD-B1FF23D56DC0}" type="datetimeFigureOut">
               <a:rPr lang="en-US" smtClean="0"/>
-              <a:t>4/3/2019</a:t>
+              <a:t>4/10/2019</a:t>
             </a:fld>
             <a:endParaRPr lang="en-US"/>
           </a:p>
@@ -3042,7 +3042,7 @@
         <p:spPr>
           <a:xfrm>
             <a:off x="-19684" y="7338330"/>
-            <a:ext cx="6858000" cy="830997"/>
+            <a:ext cx="6858000" cy="1200329"/>
           </a:xfrm>
           <a:prstGeom prst="rect">
             <a:avLst/>
@@ -3064,10 +3064,16 @@
           <a:p>
             <a:pPr algn="ctr"/>
             <a:r>
-              <a:rPr lang="en-US" sz="2400"/>
+              <a:rPr lang="en-US" sz="2400" dirty="0"/>
               <a:t>Greg Landry</a:t>
             </a:r>
-            <a:endParaRPr lang="en-US" sz="2400" dirty="0"/>
+          </a:p>
+          <a:p>
+            <a:pPr algn="ctr"/>
+            <a:r>
+              <a:rPr lang="en-US" sz="2400" dirty="0"/>
+              <a:t>Mark Saunders</a:t>
+            </a:r>
           </a:p>
         </p:txBody>
       </p:sp>

</xml_diff>

<commit_message>
Updates after WW1916 pilot class in KY.
</commit_message>
<xml_diff>
--- a/labmanual/English/WBT101-Binder-Cover.pptx
+++ b/labmanual/English/WBT101-Binder-Cover.pptx
@@ -244,7 +244,7 @@
           <a:p>
             <a:fld id="{FD9117CB-CD87-A145-B0DD-B1FF23D56DC0}" type="datetimeFigureOut">
               <a:rPr lang="en-US" smtClean="0"/>
-              <a:t>4/10/2019</a:t>
+              <a:t>4/18/2019</a:t>
             </a:fld>
             <a:endParaRPr lang="en-US"/>
           </a:p>
@@ -414,7 +414,7 @@
           <a:p>
             <a:fld id="{FD9117CB-CD87-A145-B0DD-B1FF23D56DC0}" type="datetimeFigureOut">
               <a:rPr lang="en-US" smtClean="0"/>
-              <a:t>4/10/2019</a:t>
+              <a:t>4/18/2019</a:t>
             </a:fld>
             <a:endParaRPr lang="en-US"/>
           </a:p>
@@ -594,7 +594,7 @@
           <a:p>
             <a:fld id="{FD9117CB-CD87-A145-B0DD-B1FF23D56DC0}" type="datetimeFigureOut">
               <a:rPr lang="en-US" smtClean="0"/>
-              <a:t>4/10/2019</a:t>
+              <a:t>4/18/2019</a:t>
             </a:fld>
             <a:endParaRPr lang="en-US"/>
           </a:p>
@@ -764,7 +764,7 @@
           <a:p>
             <a:fld id="{FD9117CB-CD87-A145-B0DD-B1FF23D56DC0}" type="datetimeFigureOut">
               <a:rPr lang="en-US" smtClean="0"/>
-              <a:t>4/10/2019</a:t>
+              <a:t>4/18/2019</a:t>
             </a:fld>
             <a:endParaRPr lang="en-US"/>
           </a:p>
@@ -1008,7 +1008,7 @@
           <a:p>
             <a:fld id="{FD9117CB-CD87-A145-B0DD-B1FF23D56DC0}" type="datetimeFigureOut">
               <a:rPr lang="en-US" smtClean="0"/>
-              <a:t>4/10/2019</a:t>
+              <a:t>4/18/2019</a:t>
             </a:fld>
             <a:endParaRPr lang="en-US"/>
           </a:p>
@@ -1240,7 +1240,7 @@
           <a:p>
             <a:fld id="{FD9117CB-CD87-A145-B0DD-B1FF23D56DC0}" type="datetimeFigureOut">
               <a:rPr lang="en-US" smtClean="0"/>
-              <a:t>4/10/2019</a:t>
+              <a:t>4/18/2019</a:t>
             </a:fld>
             <a:endParaRPr lang="en-US"/>
           </a:p>
@@ -1607,7 +1607,7 @@
           <a:p>
             <a:fld id="{FD9117CB-CD87-A145-B0DD-B1FF23D56DC0}" type="datetimeFigureOut">
               <a:rPr lang="en-US" smtClean="0"/>
-              <a:t>4/10/2019</a:t>
+              <a:t>4/18/2019</a:t>
             </a:fld>
             <a:endParaRPr lang="en-US"/>
           </a:p>
@@ -1725,7 +1725,7 @@
           <a:p>
             <a:fld id="{FD9117CB-CD87-A145-B0DD-B1FF23D56DC0}" type="datetimeFigureOut">
               <a:rPr lang="en-US" smtClean="0"/>
-              <a:t>4/10/2019</a:t>
+              <a:t>4/18/2019</a:t>
             </a:fld>
             <a:endParaRPr lang="en-US"/>
           </a:p>
@@ -1820,7 +1820,7 @@
           <a:p>
             <a:fld id="{FD9117CB-CD87-A145-B0DD-B1FF23D56DC0}" type="datetimeFigureOut">
               <a:rPr lang="en-US" smtClean="0"/>
-              <a:t>4/10/2019</a:t>
+              <a:t>4/18/2019</a:t>
             </a:fld>
             <a:endParaRPr lang="en-US"/>
           </a:p>
@@ -2097,7 +2097,7 @@
           <a:p>
             <a:fld id="{FD9117CB-CD87-A145-B0DD-B1FF23D56DC0}" type="datetimeFigureOut">
               <a:rPr lang="en-US" smtClean="0"/>
-              <a:t>4/10/2019</a:t>
+              <a:t>4/18/2019</a:t>
             </a:fld>
             <a:endParaRPr lang="en-US"/>
           </a:p>
@@ -2354,7 +2354,7 @@
           <a:p>
             <a:fld id="{FD9117CB-CD87-A145-B0DD-B1FF23D56DC0}" type="datetimeFigureOut">
               <a:rPr lang="en-US" smtClean="0"/>
-              <a:t>4/10/2019</a:t>
+              <a:t>4/18/2019</a:t>
             </a:fld>
             <a:endParaRPr lang="en-US"/>
           </a:p>
@@ -2567,7 +2567,7 @@
           <a:p>
             <a:fld id="{FD9117CB-CD87-A145-B0DD-B1FF23D56DC0}" type="datetimeFigureOut">
               <a:rPr lang="en-US" smtClean="0"/>
-              <a:t>4/10/2019</a:t>
+              <a:t>4/18/2019</a:t>
             </a:fld>
             <a:endParaRPr lang="en-US"/>
           </a:p>
@@ -3107,7 +3107,7 @@
           <a:p>
             <a:r>
               <a:rPr lang="en-US" sz="1050" dirty="0"/>
-              <a:t>Version 4.0</a:t>
+              <a:t>Version 4.1</a:t>
             </a:r>
           </a:p>
         </p:txBody>

</xml_diff>

<commit_message>
Updates after class in Munich
</commit_message>
<xml_diff>
--- a/labmanual/English/WBT101-Binder-Cover.pptx
+++ b/labmanual/English/WBT101-Binder-Cover.pptx
@@ -244,7 +244,7 @@
           <a:p>
             <a:fld id="{FD9117CB-CD87-A145-B0DD-B1FF23D56DC0}" type="datetimeFigureOut">
               <a:rPr lang="en-US" smtClean="0"/>
-              <a:t>5/2/2019</a:t>
+              <a:t>6/4/2019</a:t>
             </a:fld>
             <a:endParaRPr lang="en-US"/>
           </a:p>
@@ -414,7 +414,7 @@
           <a:p>
             <a:fld id="{FD9117CB-CD87-A145-B0DD-B1FF23D56DC0}" type="datetimeFigureOut">
               <a:rPr lang="en-US" smtClean="0"/>
-              <a:t>5/2/2019</a:t>
+              <a:t>6/4/2019</a:t>
             </a:fld>
             <a:endParaRPr lang="en-US"/>
           </a:p>
@@ -594,7 +594,7 @@
           <a:p>
             <a:fld id="{FD9117CB-CD87-A145-B0DD-B1FF23D56DC0}" type="datetimeFigureOut">
               <a:rPr lang="en-US" smtClean="0"/>
-              <a:t>5/2/2019</a:t>
+              <a:t>6/4/2019</a:t>
             </a:fld>
             <a:endParaRPr lang="en-US"/>
           </a:p>
@@ -764,7 +764,7 @@
           <a:p>
             <a:fld id="{FD9117CB-CD87-A145-B0DD-B1FF23D56DC0}" type="datetimeFigureOut">
               <a:rPr lang="en-US" smtClean="0"/>
-              <a:t>5/2/2019</a:t>
+              <a:t>6/4/2019</a:t>
             </a:fld>
             <a:endParaRPr lang="en-US"/>
           </a:p>
@@ -1008,7 +1008,7 @@
           <a:p>
             <a:fld id="{FD9117CB-CD87-A145-B0DD-B1FF23D56DC0}" type="datetimeFigureOut">
               <a:rPr lang="en-US" smtClean="0"/>
-              <a:t>5/2/2019</a:t>
+              <a:t>6/4/2019</a:t>
             </a:fld>
             <a:endParaRPr lang="en-US"/>
           </a:p>
@@ -1240,7 +1240,7 @@
           <a:p>
             <a:fld id="{FD9117CB-CD87-A145-B0DD-B1FF23D56DC0}" type="datetimeFigureOut">
               <a:rPr lang="en-US" smtClean="0"/>
-              <a:t>5/2/2019</a:t>
+              <a:t>6/4/2019</a:t>
             </a:fld>
             <a:endParaRPr lang="en-US"/>
           </a:p>
@@ -1607,7 +1607,7 @@
           <a:p>
             <a:fld id="{FD9117CB-CD87-A145-B0DD-B1FF23D56DC0}" type="datetimeFigureOut">
               <a:rPr lang="en-US" smtClean="0"/>
-              <a:t>5/2/2019</a:t>
+              <a:t>6/4/2019</a:t>
             </a:fld>
             <a:endParaRPr lang="en-US"/>
           </a:p>
@@ -1725,7 +1725,7 @@
           <a:p>
             <a:fld id="{FD9117CB-CD87-A145-B0DD-B1FF23D56DC0}" type="datetimeFigureOut">
               <a:rPr lang="en-US" smtClean="0"/>
-              <a:t>5/2/2019</a:t>
+              <a:t>6/4/2019</a:t>
             </a:fld>
             <a:endParaRPr lang="en-US"/>
           </a:p>
@@ -1820,7 +1820,7 @@
           <a:p>
             <a:fld id="{FD9117CB-CD87-A145-B0DD-B1FF23D56DC0}" type="datetimeFigureOut">
               <a:rPr lang="en-US" smtClean="0"/>
-              <a:t>5/2/2019</a:t>
+              <a:t>6/4/2019</a:t>
             </a:fld>
             <a:endParaRPr lang="en-US"/>
           </a:p>
@@ -2097,7 +2097,7 @@
           <a:p>
             <a:fld id="{FD9117CB-CD87-A145-B0DD-B1FF23D56DC0}" type="datetimeFigureOut">
               <a:rPr lang="en-US" smtClean="0"/>
-              <a:t>5/2/2019</a:t>
+              <a:t>6/4/2019</a:t>
             </a:fld>
             <a:endParaRPr lang="en-US"/>
           </a:p>
@@ -2354,7 +2354,7 @@
           <a:p>
             <a:fld id="{FD9117CB-CD87-A145-B0DD-B1FF23D56DC0}" type="datetimeFigureOut">
               <a:rPr lang="en-US" smtClean="0"/>
-              <a:t>5/2/2019</a:t>
+              <a:t>6/4/2019</a:t>
             </a:fld>
             <a:endParaRPr lang="en-US"/>
           </a:p>
@@ -2567,7 +2567,7 @@
           <a:p>
             <a:fld id="{FD9117CB-CD87-A145-B0DD-B1FF23D56DC0}" type="datetimeFigureOut">
               <a:rPr lang="en-US" smtClean="0"/>
-              <a:t>5/2/2019</a:t>
+              <a:t>6/4/2019</a:t>
             </a:fld>
             <a:endParaRPr lang="en-US"/>
           </a:p>
@@ -3082,9 +3082,10 @@
           <a:lstStyle/>
           <a:p>
             <a:r>
-              <a:rPr lang="en-US" sz="1050" dirty="0"/>
-              <a:t>Version 4.1</a:t>
-            </a:r>
+              <a:rPr lang="en-US" sz="1050"/>
+              <a:t>Version 4.2</a:t>
+            </a:r>
+            <a:endParaRPr lang="en-US" sz="1050" dirty="0"/>
           </a:p>
         </p:txBody>
       </p:sp>

</xml_diff>